<commit_message>
slides for topic 2
</commit_message>
<xml_diff>
--- a/slides/PANDS 1.1 Setup__.pptx
+++ b/slides/PANDS 1.1 Setup__.pptx
@@ -118,9 +118,38 @@
 <file path=ppt/revisionInfo.xml><?xml version="1.0" encoding="utf-8"?>
 <p1510:revInfo xmlns:a="http://schemas.openxmlformats.org/drawingml/2006/main" xmlns:r="http://schemas.openxmlformats.org/officeDocument/2006/relationships" xmlns:p1510="http://schemas.microsoft.com/office/powerpoint/2015/10/main">
   <p1510:revLst>
-    <p1510:client id="{6ED0097B-3ACB-4117-9B42-6402A2C960EA}" v="1" dt="2023-01-23T11:37:09.480"/>
+    <p1510:client id="{ED2A0B7E-A539-4267-A73C-96EB1647F93A}" v="1" dt="2023-01-25T16:55:52.232"/>
   </p1510:revLst>
 </p1510:revInfo>
+</file>
+
+<file path=ppt/changesInfos/changesInfo1.xml><?xml version="1.0" encoding="utf-8"?>
+<pc:chgInfo xmlns:a="http://schemas.openxmlformats.org/drawingml/2006/main" xmlns:r="http://schemas.openxmlformats.org/officeDocument/2006/relationships" xmlns:ac="http://schemas.microsoft.com/office/drawing/2013/main/command" xmlns:pc="http://schemas.microsoft.com/office/powerpoint/2013/main/command">
+  <pc:docChgLst>
+    <pc:chgData name="Andrew Beatty" userId="ddf183e3-d1da-49e1-9619-81ceb6b4ef92" providerId="ADAL" clId="{ED2A0B7E-A539-4267-A73C-96EB1647F93A}"/>
+    <pc:docChg chg="custSel modSld">
+      <pc:chgData name="Andrew Beatty" userId="ddf183e3-d1da-49e1-9619-81ceb6b4ef92" providerId="ADAL" clId="{ED2A0B7E-A539-4267-A73C-96EB1647F93A}" dt="2023-01-25T16:56:03.861" v="12" actId="27636"/>
+      <pc:docMkLst>
+        <pc:docMk/>
+      </pc:docMkLst>
+      <pc:sldChg chg="modSp mod">
+        <pc:chgData name="Andrew Beatty" userId="ddf183e3-d1da-49e1-9619-81ceb6b4ef92" providerId="ADAL" clId="{ED2A0B7E-A539-4267-A73C-96EB1647F93A}" dt="2023-01-25T16:56:03.861" v="12" actId="27636"/>
+        <pc:sldMkLst>
+          <pc:docMk/>
+          <pc:sldMk cId="1857251170" sldId="256"/>
+        </pc:sldMkLst>
+        <pc:spChg chg="mod">
+          <ac:chgData name="Andrew Beatty" userId="ddf183e3-d1da-49e1-9619-81ceb6b4ef92" providerId="ADAL" clId="{ED2A0B7E-A539-4267-A73C-96EB1647F93A}" dt="2023-01-25T16:56:03.861" v="12" actId="27636"/>
+          <ac:spMkLst>
+            <pc:docMk/>
+            <pc:sldMk cId="1857251170" sldId="256"/>
+            <ac:spMk id="3" creationId="{190AD773-E8E4-4EB2-8065-976FF11ACE30}"/>
+          </ac:spMkLst>
+        </pc:spChg>
+      </pc:sldChg>
+    </pc:docChg>
+  </pc:docChgLst>
+</pc:chgInfo>
 </file>
 
 <file path=ppt/slideLayouts/slideLayout1.xml><?xml version="1.0" encoding="utf-8"?>
@@ -526,7 +555,7 @@
           <a:p>
             <a:fld id="{83284890-85D2-4D7B-8EF5-15A9C1DB8F42}" type="datetimeFigureOut">
               <a:rPr lang="en-US" dirty="0"/>
-              <a:t>1/23/2023</a:t>
+              <a:t>1/25/2023</a:t>
             </a:fld>
             <a:endParaRPr lang="en-US" dirty="0"/>
           </a:p>
@@ -701,7 +730,7 @@
           <a:p>
             <a:fld id="{87157CC2-0FC8-4686-B024-99790E0F5162}" type="datetimeFigureOut">
               <a:rPr lang="en-US" dirty="0"/>
-              <a:t>1/23/2023</a:t>
+              <a:t>1/25/2023</a:t>
             </a:fld>
             <a:endParaRPr lang="en-US" dirty="0"/>
           </a:p>
@@ -876,7 +905,7 @@
           <a:p>
             <a:fld id="{F6764DA5-CD3D-4590-A511-FCD3BC7A793E}" type="datetimeFigureOut">
               <a:rPr lang="en-US" dirty="0"/>
-              <a:t>1/23/2023</a:t>
+              <a:t>1/25/2023</a:t>
             </a:fld>
             <a:endParaRPr lang="en-US" dirty="0"/>
           </a:p>
@@ -1041,7 +1070,7 @@
           <a:p>
             <a:fld id="{82F5661D-6934-4B32-B92C-470368BF1EC6}" type="datetimeFigureOut">
               <a:rPr lang="en-US" dirty="0"/>
-              <a:t>1/23/2023</a:t>
+              <a:t>1/25/2023</a:t>
             </a:fld>
             <a:endParaRPr lang="en-US" dirty="0"/>
           </a:p>
@@ -1349,7 +1378,7 @@
           <a:p>
             <a:fld id="{C6F822A4-8DA6-4447-9B1F-C5DB58435268}" type="datetimeFigureOut">
               <a:rPr lang="en-US" dirty="0"/>
-              <a:t>1/23/2023</a:t>
+              <a:t>1/25/2023</a:t>
             </a:fld>
             <a:endParaRPr lang="en-US" dirty="0"/>
           </a:p>
@@ -1731,7 +1760,7 @@
           <a:p>
             <a:fld id="{E548D31E-DCDA-41A7-9C67-C4B11B94D21D}" type="datetimeFigureOut">
               <a:rPr lang="en-US" dirty="0"/>
-              <a:t>1/23/2023</a:t>
+              <a:t>1/25/2023</a:t>
             </a:fld>
             <a:endParaRPr lang="en-US" dirty="0"/>
           </a:p>
@@ -2160,7 +2189,7 @@
           <a:p>
             <a:fld id="{9B3762C0-B258-48F1-ADE6-176B4174CCDD}" type="datetimeFigureOut">
               <a:rPr lang="en-US" dirty="0"/>
-              <a:t>1/23/2023</a:t>
+              <a:t>1/25/2023</a:t>
             </a:fld>
             <a:endParaRPr lang="en-US" dirty="0"/>
           </a:p>
@@ -2273,7 +2302,7 @@
           <a:p>
             <a:fld id="{677919A6-33EB-49BD-A62F-1FA56B9F9712}" type="datetimeFigureOut">
               <a:rPr lang="en-US" dirty="0"/>
-              <a:t>1/23/2023</a:t>
+              <a:t>1/25/2023</a:t>
             </a:fld>
             <a:endParaRPr lang="en-US" dirty="0"/>
           </a:p>
@@ -2363,7 +2392,7 @@
           <a:p>
             <a:fld id="{CA4E7D1B-D673-4CF6-8672-009D42ABD2A0}" type="datetimeFigureOut">
               <a:rPr lang="en-US" dirty="0"/>
-              <a:t>1/23/2023</a:t>
+              <a:t>1/25/2023</a:t>
             </a:fld>
             <a:endParaRPr lang="en-US" dirty="0"/>
           </a:p>
@@ -2708,7 +2737,7 @@
           <a:p>
             <a:fld id="{DA16AA21-1863-4931-97CB-99D0A168701B}" type="datetimeFigureOut">
               <a:rPr lang="en-US" dirty="0"/>
-              <a:t>1/23/2023</a:t>
+              <a:t>1/25/2023</a:t>
             </a:fld>
             <a:endParaRPr lang="en-US" dirty="0"/>
           </a:p>
@@ -3128,7 +3157,7 @@
           <a:p>
             <a:fld id="{3772C379-9A7C-4C87-A116-CBE9F58B04C5}" type="datetimeFigureOut">
               <a:rPr lang="en-US" dirty="0"/>
-              <a:t>1/23/2023</a:t>
+              <a:t>1/25/2023</a:t>
             </a:fld>
             <a:endParaRPr lang="en-US" dirty="0"/>
           </a:p>
@@ -3404,7 +3433,7 @@
           <a:p>
             <a:fld id="{8664C608-40B1-4030-A28D-5B74BC98ADCE}" type="datetimeFigureOut">
               <a:rPr lang="en-US" dirty="0"/>
-              <a:t>1/23/2023</a:t>
+              <a:t>1/25/2023</a:t>
             </a:fld>
             <a:endParaRPr lang="en-US" dirty="0"/>
           </a:p>
@@ -4024,13 +4053,13 @@
         <p:spPr/>
         <p:txBody>
           <a:bodyPr>
-            <a:normAutofit fontScale="92500" lnSpcReduction="20000"/>
+            <a:normAutofit/>
           </a:bodyPr>
           <a:lstStyle/>
           <a:p>
             <a:r>
               <a:rPr lang="en-IE" dirty="0"/>
-              <a:t>Andrew Beatty</a:t>
+              <a:t>Programming and Scripting</a:t>
             </a:r>
           </a:p>
           <a:p>
@@ -4038,15 +4067,15 @@
               <a:rPr lang="en-IE" dirty="0">
                 <a:hlinkClick r:id="rId2"/>
               </a:rPr>
-              <a:t>Andrew.Beatty@gmit.ie</a:t>
+              <a:t>Andrew.Beatty@atu</a:t>
+            </a:r>
+            <a:r>
+              <a:rPr lang="en-IE">
+                <a:hlinkClick r:id="rId2"/>
+              </a:rPr>
+              <a:t>.ie</a:t>
             </a:r>
             <a:endParaRPr lang="en-IE" dirty="0"/>
-          </a:p>
-          <a:p>
-            <a:r>
-              <a:rPr lang="en-IE" dirty="0"/>
-              <a:t>Programming and Scripting</a:t>
-            </a:r>
           </a:p>
         </p:txBody>
       </p:sp>
@@ -4604,12 +4633,9 @@
 </file>
 
 <file path=customXml/item1.xml><?xml version="1.0" encoding="utf-8"?>
-<?mso-contentType ?>
-<FormTemplates xmlns="http://schemas.microsoft.com/sharepoint/v3/contenttype/forms">
-  <Display>DocumentLibraryForm</Display>
-  <Edit>DocumentLibraryForm</Edit>
-  <New>DocumentLibraryForm</New>
-</FormTemplates>
+<p:properties xmlns:p="http://schemas.microsoft.com/office/2006/metadata/properties" xmlns:xsi="http://www.w3.org/2001/XMLSchema-instance" xmlns:pc="http://schemas.microsoft.com/office/infopath/2007/PartnerControls">
+  <documentManagement/>
+</p:properties>
 </file>
 
 <file path=customXml/item2.xml><?xml version="1.0" encoding="utf-8"?>
@@ -4822,15 +4848,19 @@
 </file>
 
 <file path=customXml/item3.xml><?xml version="1.0" encoding="utf-8"?>
-<p:properties xmlns:p="http://schemas.microsoft.com/office/2006/metadata/properties" xmlns:xsi="http://www.w3.org/2001/XMLSchema-instance" xmlns:pc="http://schemas.microsoft.com/office/infopath/2007/PartnerControls">
-  <documentManagement/>
-</p:properties>
+<?mso-contentType ?>
+<FormTemplates xmlns="http://schemas.microsoft.com/sharepoint/v3/contenttype/forms">
+  <Display>DocumentLibraryForm</Display>
+  <Edit>DocumentLibraryForm</Edit>
+  <New>DocumentLibraryForm</New>
+</FormTemplates>
 </file>
 
 <file path=customXml/itemProps1.xml><?xml version="1.0" encoding="utf-8"?>
-<ds:datastoreItem xmlns:ds="http://schemas.openxmlformats.org/officeDocument/2006/customXml" ds:itemID="{BF3BE34A-32C9-4C91-B1CF-33F70A7D8BAD}">
+<ds:datastoreItem xmlns:ds="http://schemas.openxmlformats.org/officeDocument/2006/customXml" ds:itemID="{093F962E-2A62-4241-9ED6-8AA3A164CFB6}">
   <ds:schemaRefs>
-    <ds:schemaRef ds:uri="http://schemas.microsoft.com/sharepoint/v3/contenttype/forms"/>
+    <ds:schemaRef ds:uri="http://schemas.microsoft.com/office/2006/metadata/properties"/>
+    <ds:schemaRef ds:uri="http://schemas.microsoft.com/office/infopath/2007/PartnerControls"/>
   </ds:schemaRefs>
 </ds:datastoreItem>
 </file>
@@ -4855,10 +4885,9 @@
 </file>
 
 <file path=customXml/itemProps3.xml><?xml version="1.0" encoding="utf-8"?>
-<ds:datastoreItem xmlns:ds="http://schemas.openxmlformats.org/officeDocument/2006/customXml" ds:itemID="{093F962E-2A62-4241-9ED6-8AA3A164CFB6}">
+<ds:datastoreItem xmlns:ds="http://schemas.openxmlformats.org/officeDocument/2006/customXml" ds:itemID="{BF3BE34A-32C9-4C91-B1CF-33F70A7D8BAD}">
   <ds:schemaRefs>
-    <ds:schemaRef ds:uri="http://schemas.microsoft.com/office/2006/metadata/properties"/>
-    <ds:schemaRef ds:uri="http://schemas.microsoft.com/office/infopath/2007/PartnerControls"/>
+    <ds:schemaRef ds:uri="http://schemas.microsoft.com/sharepoint/v3/contenttype/forms"/>
   </ds:schemaRefs>
 </ds:datastoreItem>
 </file>
</xml_diff>